<commit_message>
updated readme and code
</commit_message>
<xml_diff>
--- a/SplitMergeEvolveClustering.pptx
+++ b/SplitMergeEvolveClustering.pptx
@@ -6020,7 +6020,7 @@
             <a:pPr lvl="1"/>
             <a:r>
               <a:rPr lang="en-US" dirty="0"/>
-              <a:t> 3 types of Iris flowers, 4 attributes</a:t>
+              <a:t> 3 classes of Iris flowers, 4 attributes</a:t>
             </a:r>
           </a:p>
           <a:p>
@@ -6053,7 +6053,7 @@
             <a:pPr lvl="1"/>
             <a:r>
               <a:rPr lang="en-US" dirty="0"/>
-              <a:t>From US forensic science service, 6 types of glasses, 9 attributes</a:t>
+              <a:t>From US forensic science service, 6 classes of glasses, 9 attributes</a:t>
             </a:r>
           </a:p>
         </p:txBody>
@@ -6681,11 +6681,20 @@
         </p:nvSpPr>
         <p:spPr/>
         <p:txBody>
-          <a:bodyPr/>
+          <a:bodyPr>
+            <a:normAutofit/>
+          </a:bodyPr>
           <a:lstStyle/>
           <a:p>
             <a:r>
               <a:rPr lang="en-US" dirty="0"/>
+              <a:t>K-means </a:t>
+            </a:r>
+            <a:br>
+              <a:rPr lang="en-US" dirty="0"/>
+            </a:br>
+            <a:r>
+              <a:rPr lang="en-US" sz="2700" dirty="0"/>
               <a:t>Existing clustering algorithms</a:t>
             </a:r>
           </a:p>
@@ -6705,8 +6714,8 @@
         </p:nvSpPr>
         <p:spPr>
           <a:xfrm>
-            <a:off x="3667027" y="4373110"/>
-            <a:ext cx="5234669" cy="1708160"/>
+            <a:off x="3610466" y="4020979"/>
+            <a:ext cx="5458120" cy="2446824"/>
           </a:xfrm>
           <a:prstGeom prst="rect">
             <a:avLst/>
@@ -6724,7 +6733,7 @@
               <a:buChar char="•"/>
             </a:pPr>
             <a:r>
-              <a:rPr lang="en-US" sz="1400" dirty="0"/>
+              <a:rPr lang="en-US" sz="1800" dirty="0"/>
               <a:t>Randomly chooses k initial centroids</a:t>
             </a:r>
           </a:p>
@@ -6734,7 +6743,7 @@
               <a:buChar char="•"/>
             </a:pPr>
             <a:r>
-              <a:rPr lang="en-US" sz="1400" dirty="0"/>
+              <a:rPr lang="en-US" sz="1800" dirty="0"/>
               <a:t>Assigns data vectors to clusters and re-calculates centroids until centroids do not change any more</a:t>
             </a:r>
           </a:p>
@@ -6744,7 +6753,7 @@
               <a:buChar char="•"/>
             </a:pPr>
             <a:r>
-              <a:rPr lang="en-US" sz="1400" dirty="0"/>
+              <a:rPr lang="en-US" sz="1800" dirty="0"/>
               <a:t>Key metric is the distance between centroids and data vectors</a:t>
             </a:r>
           </a:p>
@@ -6754,7 +6763,7 @@
               <a:buChar char="•"/>
             </a:pPr>
             <a:r>
-              <a:rPr lang="en-US" sz="1400" dirty="0"/>
+              <a:rPr lang="en-US" sz="1800" dirty="0"/>
               <a:t>Manhattan distance, Euclidian distance, etc.</a:t>
             </a:r>
           </a:p>
@@ -6782,7 +6791,7 @@
         </p:blipFill>
         <p:spPr>
           <a:xfrm>
-            <a:off x="3800073" y="1630810"/>
+            <a:off x="3630020" y="1428471"/>
             <a:ext cx="4258269" cy="2000529"/>
           </a:xfrm>
           <a:prstGeom prst="rect">
@@ -6812,7 +6821,7 @@
         </p:blipFill>
         <p:spPr>
           <a:xfrm>
-            <a:off x="318790" y="1630810"/>
+            <a:off x="393701" y="1630810"/>
             <a:ext cx="2896004" cy="3372321"/>
           </a:xfrm>
           <a:prstGeom prst="rect">
@@ -6868,11 +6877,20 @@
         </p:nvSpPr>
         <p:spPr/>
         <p:txBody>
-          <a:bodyPr/>
+          <a:bodyPr>
+            <a:normAutofit/>
+          </a:bodyPr>
           <a:lstStyle/>
           <a:p>
             <a:r>
               <a:rPr lang="en-US" dirty="0"/>
+              <a:t>Bisecting k-means </a:t>
+            </a:r>
+            <a:br>
+              <a:rPr lang="en-US" dirty="0"/>
+            </a:br>
+            <a:r>
+              <a:rPr lang="en-US" sz="2700" dirty="0"/>
               <a:t>Existing clustering algorithms</a:t>
             </a:r>
           </a:p>
@@ -6892,8 +6910,8 @@
         </p:nvSpPr>
         <p:spPr>
           <a:xfrm>
-            <a:off x="3702579" y="4594567"/>
-            <a:ext cx="5147869" cy="1492716"/>
+            <a:off x="3702579" y="4123227"/>
+            <a:ext cx="5147869" cy="1892826"/>
           </a:xfrm>
           <a:prstGeom prst="rect">
             <a:avLst/>
@@ -6911,7 +6929,7 @@
               <a:buChar char="•"/>
             </a:pPr>
             <a:r>
-              <a:rPr lang="en-US" sz="1400" dirty="0"/>
+              <a:rPr lang="en-US" sz="1800" dirty="0"/>
               <a:t>Starts with 1 cluster</a:t>
             </a:r>
           </a:p>
@@ -6921,7 +6939,7 @@
               <a:buChar char="•"/>
             </a:pPr>
             <a:r>
-              <a:rPr lang="en-US" sz="1400" dirty="0"/>
+              <a:rPr lang="en-US" sz="1800" dirty="0"/>
               <a:t>Iteratively picks the worst cluster to split until k clusters are formed</a:t>
             </a:r>
           </a:p>
@@ -6931,7 +6949,7 @@
               <a:buChar char="•"/>
             </a:pPr>
             <a:r>
-              <a:rPr lang="en-US" sz="1400" dirty="0"/>
+              <a:rPr lang="en-US" sz="1800" dirty="0"/>
               <a:t>Key measure is the quality of a cluster</a:t>
             </a:r>
           </a:p>
@@ -6941,7 +6959,7 @@
               <a:buChar char="•"/>
             </a:pPr>
             <a:r>
-              <a:rPr lang="en-US" sz="1400" dirty="0"/>
+              <a:rPr lang="en-US" sz="1800" dirty="0"/>
               <a:t>E.g., within cluster median distance</a:t>
             </a:r>
           </a:p>
@@ -7104,13 +7122,27 @@
             <p:ph type="title"/>
           </p:nvPr>
         </p:nvSpPr>
-        <p:spPr/>
-        <p:txBody>
-          <a:bodyPr/>
+        <p:spPr>
+          <a:xfrm>
+            <a:off x="393701" y="239713"/>
+            <a:ext cx="7845326" cy="1085371"/>
+          </a:xfrm>
+        </p:spPr>
+        <p:txBody>
+          <a:bodyPr>
+            <a:normAutofit fontScale="90000"/>
+          </a:bodyPr>
           <a:lstStyle/>
           <a:p>
             <a:r>
               <a:rPr lang="en-US" dirty="0"/>
+              <a:t>Agglomerative hierarchical clustering </a:t>
+            </a:r>
+            <a:br>
+              <a:rPr lang="en-US" dirty="0"/>
+            </a:br>
+            <a:r>
+              <a:rPr lang="en-US" sz="3100" dirty="0"/>
               <a:t>Existing clustering algorithms</a:t>
             </a:r>
           </a:p>
@@ -7130,8 +7162,8 @@
         </p:nvSpPr>
         <p:spPr>
           <a:xfrm>
-            <a:off x="3897261" y="4579812"/>
-            <a:ext cx="4759214" cy="1492716"/>
+            <a:off x="3775394" y="4245354"/>
+            <a:ext cx="4759214" cy="2169825"/>
           </a:xfrm>
           <a:prstGeom prst="rect">
             <a:avLst/>
@@ -7149,7 +7181,7 @@
               <a:buChar char="•"/>
             </a:pPr>
             <a:r>
-              <a:rPr lang="en-US" sz="1400" dirty="0"/>
+              <a:rPr lang="en-US" sz="1800" dirty="0"/>
               <a:t>Starts with singleton clusters</a:t>
             </a:r>
           </a:p>
@@ -7159,7 +7191,7 @@
               <a:buChar char="•"/>
             </a:pPr>
             <a:r>
-              <a:rPr lang="en-US" sz="1400" dirty="0"/>
+              <a:rPr lang="en-US" sz="1800" dirty="0"/>
               <a:t>Keeps merging pairs of closest clusters in a tree structure until k clusters are formed</a:t>
             </a:r>
           </a:p>
@@ -7169,7 +7201,7 @@
               <a:buChar char="•"/>
             </a:pPr>
             <a:r>
-              <a:rPr lang="en-US" sz="1400" dirty="0"/>
+              <a:rPr lang="en-US" sz="1800" dirty="0"/>
               <a:t>Key metric is the distance between clusters</a:t>
             </a:r>
           </a:p>
@@ -7179,7 +7211,7 @@
               <a:buChar char="•"/>
             </a:pPr>
             <a:r>
-              <a:rPr lang="en-US" sz="1400" dirty="0"/>
+              <a:rPr lang="en-US" sz="1800" dirty="0"/>
               <a:t>E.g., Ward’s or link-based method</a:t>
             </a:r>
           </a:p>
@@ -7207,7 +7239,7 @@
         </p:blipFill>
         <p:spPr>
           <a:xfrm>
-            <a:off x="4140995" y="1774412"/>
+            <a:off x="3897261" y="1885735"/>
             <a:ext cx="4515480" cy="1543265"/>
           </a:xfrm>
           <a:prstGeom prst="rect">
@@ -7229,7 +7261,7 @@
         </p:nvGrpSpPr>
         <p:grpSpPr>
           <a:xfrm>
-            <a:off x="293552" y="1417565"/>
+            <a:off x="293552" y="1722987"/>
             <a:ext cx="3168063" cy="3412025"/>
             <a:chOff x="293552" y="1417565"/>
             <a:chExt cx="3168063" cy="3412025"/>
@@ -7342,7 +7374,12 @@
             <p:ph type="title"/>
           </p:nvPr>
         </p:nvSpPr>
-        <p:spPr/>
+        <p:spPr>
+          <a:xfrm>
+            <a:off x="186312" y="78018"/>
+            <a:ext cx="7494588" cy="1085371"/>
+          </a:xfrm>
+        </p:spPr>
         <p:txBody>
           <a:bodyPr>
             <a:normAutofit/>
@@ -7378,7 +7415,7 @@
         </p:blipFill>
         <p:spPr>
           <a:xfrm>
-            <a:off x="0" y="1091985"/>
+            <a:off x="0" y="931730"/>
             <a:ext cx="9144000" cy="3325091"/>
           </a:xfrm>
           <a:prstGeom prst="rect">
@@ -7400,8 +7437,8 @@
         </p:nvSpPr>
         <p:spPr>
           <a:xfrm>
-            <a:off x="3342358" y="4574637"/>
-            <a:ext cx="6305420" cy="1815882"/>
+            <a:off x="2607068" y="4256821"/>
+            <a:ext cx="6305420" cy="2308324"/>
           </a:xfrm>
           <a:prstGeom prst="rect">
             <a:avLst/>
@@ -7415,10 +7452,10 @@
           <a:lstStyle/>
           <a:p>
             <a:r>
-              <a:rPr lang="en-US" sz="1400" b="1" i="1" dirty="0"/>
+              <a:rPr lang="en-US" sz="1600" b="1" i="1" dirty="0"/>
               <a:t>Split-merge-evolve</a:t>
             </a:r>
-            <a:endParaRPr lang="en-US" sz="1400" dirty="0"/>
+            <a:endParaRPr lang="en-US" sz="1600" dirty="0"/>
           </a:p>
           <a:p>
             <a:pPr marL="285750" indent="-285750">
@@ -7426,15 +7463,15 @@
               <a:buChar char="•"/>
             </a:pPr>
             <a:r>
-              <a:rPr lang="en-US" sz="1400" dirty="0"/>
+              <a:rPr lang="en-US" sz="1600" dirty="0"/>
               <a:t>Randomly </a:t>
             </a:r>
             <a:r>
-              <a:rPr lang="en-US" sz="1400" dirty="0" err="1"/>
+              <a:rPr lang="en-US" sz="1600" dirty="0" err="1"/>
               <a:t>initialises</a:t>
             </a:r>
             <a:r>
-              <a:rPr lang="en-US" sz="1400" dirty="0"/>
+              <a:rPr lang="en-US" sz="1600" dirty="0"/>
               <a:t> k clusters</a:t>
             </a:r>
           </a:p>
@@ -7444,7 +7481,7 @@
               <a:buChar char="•"/>
             </a:pPr>
             <a:r>
-              <a:rPr lang="en-US" sz="1400" dirty="0"/>
+              <a:rPr lang="en-US" sz="1600" dirty="0"/>
               <a:t>Keeps splitting bad clusters and merging closest clusters until the clustering result evolves towards the user-defined quality measure </a:t>
             </a:r>
           </a:p>
@@ -7454,7 +7491,7 @@
               <a:buChar char="•"/>
             </a:pPr>
             <a:r>
-              <a:rPr lang="en-US" sz="1400" dirty="0"/>
+              <a:rPr lang="en-US" sz="1600" dirty="0"/>
               <a:t>Key metrics for each step in iteration:</a:t>
             </a:r>
           </a:p>
@@ -7464,7 +7501,7 @@
               <a:buChar char="•"/>
             </a:pPr>
             <a:r>
-              <a:rPr lang="en-US" sz="1400" dirty="0"/>
+              <a:rPr lang="en-US" sz="1600" dirty="0"/>
               <a:t>+quality of cluster/user-defined quality measure</a:t>
             </a:r>
           </a:p>

</xml_diff>